<commit_message>
refactor: tách hệ thống inject slide thành mô hình plugin mở rộng
- Tạo kiến trúc injector theo dạng plugin sử dụng INJECTOR_REGISTRY
- Thêm BaseSlideInjector và InjectContext để chuẩn hóa luồng inject
- Áp dụng TitleInjector và BasicInfoInjector thay cho hàm inject cứng
- Di chuyển extract_md.py vào core/dlmarkdown, trả về object BasicInfo
- Bổ sung module trợ giúp: pptxdata_utils.py, contract.py (enum tên shape)
- Cập nhật build.py để gọi inject theo tag `inject_id` trong slide
- Thêm config debug riêng cho build.py trong launch.json

Mục tiêu: giúp hệ thống dễ mở rộng khi cần inject thêm các loại nội dung mới vào slide PPTX.
</commit_message>
<xml_diff>
--- a/template/Pre_DOI_Form_05_2024_v3.pptx
+++ b/template/Pre_DOI_Form_05_2024_v3.pptx
@@ -310,7 +310,7 @@
           <a:p>
             <a:fld id="{5BCAD085-E8A6-8845-BD4E-CB4CCA059FC4}" type="datetimeFigureOut">
               <a:rPr lang="en-US" smtClean="0"/>
-              <a:t>7/8/2025</a:t>
+              <a:t>7/9/2025</a:t>
             </a:fld>
             <a:endParaRPr lang="en-US"/>
           </a:p>
@@ -478,7 +478,7 @@
           <a:p>
             <a:fld id="{5BCAD085-E8A6-8845-BD4E-CB4CCA059FC4}" type="datetimeFigureOut">
               <a:rPr lang="en-US" smtClean="0"/>
-              <a:t>7/8/2025</a:t>
+              <a:t>7/9/2025</a:t>
             </a:fld>
             <a:endParaRPr lang="en-US"/>
           </a:p>
@@ -656,7 +656,7 @@
           <a:p>
             <a:fld id="{5BCAD085-E8A6-8845-BD4E-CB4CCA059FC4}" type="datetimeFigureOut">
               <a:rPr lang="en-US" smtClean="0"/>
-              <a:t>7/8/2025</a:t>
+              <a:t>7/9/2025</a:t>
             </a:fld>
             <a:endParaRPr lang="en-US"/>
           </a:p>
@@ -824,7 +824,7 @@
           <a:p>
             <a:fld id="{5BCAD085-E8A6-8845-BD4E-CB4CCA059FC4}" type="datetimeFigureOut">
               <a:rPr lang="en-US" smtClean="0"/>
-              <a:t>7/8/2025</a:t>
+              <a:t>7/9/2025</a:t>
             </a:fld>
             <a:endParaRPr lang="en-US"/>
           </a:p>
@@ -1069,7 +1069,7 @@
           <a:p>
             <a:fld id="{5BCAD085-E8A6-8845-BD4E-CB4CCA059FC4}" type="datetimeFigureOut">
               <a:rPr lang="en-US" smtClean="0"/>
-              <a:t>7/8/2025</a:t>
+              <a:t>7/9/2025</a:t>
             </a:fld>
             <a:endParaRPr lang="en-US"/>
           </a:p>
@@ -1354,7 +1354,7 @@
           <a:p>
             <a:fld id="{5BCAD085-E8A6-8845-BD4E-CB4CCA059FC4}" type="datetimeFigureOut">
               <a:rPr lang="en-US" smtClean="0"/>
-              <a:t>7/8/2025</a:t>
+              <a:t>7/9/2025</a:t>
             </a:fld>
             <a:endParaRPr lang="en-US"/>
           </a:p>
@@ -1773,7 +1773,7 @@
           <a:p>
             <a:fld id="{5BCAD085-E8A6-8845-BD4E-CB4CCA059FC4}" type="datetimeFigureOut">
               <a:rPr lang="en-US" smtClean="0"/>
-              <a:t>7/8/2025</a:t>
+              <a:t>7/9/2025</a:t>
             </a:fld>
             <a:endParaRPr lang="en-US"/>
           </a:p>
@@ -1890,7 +1890,7 @@
           <a:p>
             <a:fld id="{5BCAD085-E8A6-8845-BD4E-CB4CCA059FC4}" type="datetimeFigureOut">
               <a:rPr lang="en-US" smtClean="0"/>
-              <a:t>7/8/2025</a:t>
+              <a:t>7/9/2025</a:t>
             </a:fld>
             <a:endParaRPr lang="en-US"/>
           </a:p>
@@ -1985,7 +1985,7 @@
           <a:p>
             <a:fld id="{5BCAD085-E8A6-8845-BD4E-CB4CCA059FC4}" type="datetimeFigureOut">
               <a:rPr lang="en-US" smtClean="0"/>
-              <a:t>7/8/2025</a:t>
+              <a:t>7/9/2025</a:t>
             </a:fld>
             <a:endParaRPr lang="en-US"/>
           </a:p>
@@ -2260,7 +2260,7 @@
           <a:p>
             <a:fld id="{5BCAD085-E8A6-8845-BD4E-CB4CCA059FC4}" type="datetimeFigureOut">
               <a:rPr lang="en-US" smtClean="0"/>
-              <a:t>7/8/2025</a:t>
+              <a:t>7/9/2025</a:t>
             </a:fld>
             <a:endParaRPr lang="en-US"/>
           </a:p>
@@ -2512,7 +2512,7 @@
           <a:p>
             <a:fld id="{5BCAD085-E8A6-8845-BD4E-CB4CCA059FC4}" type="datetimeFigureOut">
               <a:rPr lang="en-US" smtClean="0"/>
-              <a:t>7/8/2025</a:t>
+              <a:t>7/9/2025</a:t>
             </a:fld>
             <a:endParaRPr lang="en-US"/>
           </a:p>
@@ -2723,7 +2723,7 @@
           <a:p>
             <a:fld id="{5BCAD085-E8A6-8845-BD4E-CB4CCA059FC4}" type="datetimeFigureOut">
               <a:rPr lang="en-US" smtClean="0"/>
-              <a:t>7/8/2025</a:t>
+              <a:t>7/9/2025</a:t>
             </a:fld>
             <a:endParaRPr lang="en-US"/>
           </a:p>
@@ -3100,7 +3100,7 @@
       </p:grpSpPr>
       <p:sp>
         <p:nvSpPr>
-          <p:cNvPr id="2" name="Rectangle 1"/>
+          <p:cNvPr id="2" name="ELE_TITLE_SHAPE"/>
           <p:cNvSpPr/>
           <p:nvPr/>
         </p:nvSpPr>

</xml_diff>

<commit_message>
Refactor slide content and support "none" fill in shapes
- Gộp các đoạn text split nhiều run về 1 run duy nhất:
  + "☐ " + "Priority in applying" → "☐ Priority in applying"
  + "PRIVILEGED AND CONFIDENTIAL ATTORNEY CLIENT" + "COMMUNICATION" → gộp lại
  + "2" + ". Problem" → "2. Problem"
  + "3" + ". Prior art" → "3. Prior art"

- Đổi type các shape "Freeform" từ 5 → 17 để đồng nhất nhận diện textbox

- Đổi tên các bảng đặc biệt:
  + AbbreviationTable → ELE_ABBREVIATION_TABLE
  + AppendixTable → ELE_APEENDIX_TABLE

- Tối giản nội dung bảng abbreviation:
  + Chỉ giữ lại 2 dòng: header + 1 dòng rỗng
  + Font size nâng từ 9pt → 16pt, bỏ màu font mặc định

- Thêm 2 shape mới để hỗ trợ vertical content:
  + ELE_VERTICAL_TEXT_AREA (background_fill_color = "none")
  + ELE_VERTICAL_IMAGE_AREA (background_fill_color = "none")

- Cập nhật inject_id cho slide background (bg_problem_slide → bg_problem_field_slide)

- Cập nhật lại height một số shape cho khớp layout mới
</commit_message>
<xml_diff>
--- a/template/Pre_DOI_Form_05_2024_v3.pptx
+++ b/template/Pre_DOI_Form_05_2024_v3.pptx
@@ -3236,11 +3236,17 @@
       </p:grpSpPr>
       <p:graphicFrame>
         <p:nvGraphicFramePr>
-          <p:cNvPr id="2" name="Table 1"/>
+          <p:cNvPr id="2" name="ELE_BASICINFO_TABLE"/>
           <p:cNvGraphicFramePr>
             <a:graphicFrameLocks noGrp="1"/>
           </p:cNvGraphicFramePr>
-          <p:nvPr/>
+          <p:nvPr>
+            <p:extLst>
+              <p:ext uri="{D42A27DB-BD31-4B8C-83A1-F6EECF244321}">
+                <p14:modId xmlns:p14="http://schemas.microsoft.com/office/powerpoint/2010/main" val="2614552836"/>
+              </p:ext>
+            </p:extLst>
+          </p:nvPr>
         </p:nvGraphicFramePr>
         <p:xfrm>
           <a:off x="0" y="704850"/>
@@ -5759,21 +5765,21 @@
       </p:sp>
       <p:graphicFrame>
         <p:nvGraphicFramePr>
-          <p:cNvPr id="4" name="Table 3"/>
+          <p:cNvPr id="4" name="ELE_ABBREVIATION_TABLE"/>
           <p:cNvGraphicFramePr>
             <a:graphicFrameLocks noGrp="1"/>
           </p:cNvGraphicFramePr>
           <p:nvPr>
             <p:extLst>
               <p:ext uri="{D42A27DB-BD31-4B8C-83A1-F6EECF244321}">
-                <p14:modId xmlns:p14="http://schemas.microsoft.com/office/powerpoint/2010/main" val="1282267663"/>
+                <p14:modId xmlns:p14="http://schemas.microsoft.com/office/powerpoint/2010/main" val="534184054"/>
               </p:ext>
             </p:extLst>
           </p:nvPr>
         </p:nvGraphicFramePr>
         <p:xfrm>
           <a:off x="771525" y="847725"/>
-          <a:ext cx="10668000" cy="634810"/>
+          <a:ext cx="10668000" cy="603631"/>
         </p:xfrm>
         <a:graphic>
           <a:graphicData uri="http://schemas.openxmlformats.org/drawingml/2006/table">
@@ -5941,7 +5947,10 @@
                           <a:spcPct val="107000"/>
                         </a:lnSpc>
                       </a:pPr>
-                      <a:endParaRPr/>
+                      <a:endParaRPr sz="1600">
+                        <a:latin typeface="Calibri" panose="020F0502020204030204" pitchFamily="34" charset="0"/>
+                        <a:cs typeface="Calibri" panose="020F0502020204030204" pitchFamily="34" charset="0"/>
+                      </a:endParaRPr>
                     </a:p>
                   </a:txBody>
                   <a:tcPr>
@@ -5996,7 +6005,10 @@
                           <a:spcPct val="107000"/>
                         </a:lnSpc>
                       </a:pPr>
-                      <a:endParaRPr/>
+                      <a:endParaRPr sz="1600">
+                        <a:latin typeface="Calibri" panose="020F0502020204030204" pitchFamily="34" charset="0"/>
+                        <a:cs typeface="Calibri" panose="020F0502020204030204" pitchFamily="34" charset="0"/>
+                      </a:endParaRPr>
                     </a:p>
                   </a:txBody>
                   <a:tcPr>
@@ -6250,21 +6262,21 @@
       </p:sp>
       <p:graphicFrame>
         <p:nvGraphicFramePr>
-          <p:cNvPr id="4" name="Table 3"/>
+          <p:cNvPr id="4" name="ELE_APEENDIX_TABLE"/>
           <p:cNvGraphicFramePr>
             <a:graphicFrameLocks noGrp="1"/>
           </p:cNvGraphicFramePr>
           <p:nvPr>
             <p:extLst>
               <p:ext uri="{D42A27DB-BD31-4B8C-83A1-F6EECF244321}">
-                <p14:modId xmlns:p14="http://schemas.microsoft.com/office/powerpoint/2010/main" val="3569922329"/>
+                <p14:modId xmlns:p14="http://schemas.microsoft.com/office/powerpoint/2010/main" val="1307125561"/>
               </p:ext>
             </p:extLst>
           </p:nvPr>
         </p:nvGraphicFramePr>
         <p:xfrm>
           <a:off x="771525" y="847725"/>
-          <a:ext cx="10668000" cy="634810"/>
+          <a:ext cx="10668000" cy="603631"/>
         </p:xfrm>
         <a:graphic>
           <a:graphicData uri="http://schemas.openxmlformats.org/drawingml/2006/table">
@@ -6432,7 +6444,10 @@
                           <a:spcPct val="107000"/>
                         </a:lnSpc>
                       </a:pPr>
-                      <a:endParaRPr/>
+                      <a:endParaRPr sz="1600">
+                        <a:latin typeface="Calibri" panose="020F0502020204030204" pitchFamily="34" charset="0"/>
+                        <a:cs typeface="Calibri" panose="020F0502020204030204" pitchFamily="34" charset="0"/>
+                      </a:endParaRPr>
                     </a:p>
                   </a:txBody>
                   <a:tcPr>
@@ -6487,7 +6502,10 @@
                           <a:spcPct val="107000"/>
                         </a:lnSpc>
                       </a:pPr>
-                      <a:endParaRPr/>
+                      <a:endParaRPr sz="1600">
+                        <a:latin typeface="Calibri" panose="020F0502020204030204" pitchFamily="34" charset="0"/>
+                        <a:cs typeface="Calibri" panose="020F0502020204030204" pitchFamily="34" charset="0"/>
+                      </a:endParaRPr>
                     </a:p>
                   </a:txBody>
                   <a:tcPr>
@@ -6835,7 +6853,13 @@
           <a:lstStyle/>
           <a:p>
             <a:pPr algn="ctr"/>
-            <a:endParaRPr/>
+            <a:endParaRPr sz="1600">
+              <a:solidFill>
+                <a:srgbClr val="000000"/>
+              </a:solidFill>
+              <a:latin typeface="Calibri" panose="020F0502020204030204" pitchFamily="34" charset="0"/>
+              <a:cs typeface="Calibri" panose="020F0502020204030204" pitchFamily="34" charset="0"/>
+            </a:endParaRPr>
           </a:p>
         </p:txBody>
       </p:sp>
@@ -6914,6 +6938,114 @@
               </a:rPr>
               <a:t>"}</a:t>
             </a:r>
+          </a:p>
+        </p:txBody>
+      </p:sp>
+      <p:sp>
+        <p:nvSpPr>
+          <p:cNvPr id="7" name="ELE_VERTICAL_TEXT_AREA">
+            <a:extLst>
+              <a:ext uri="{FF2B5EF4-FFF2-40B4-BE49-F238E27FC236}">
+                <a16:creationId xmlns:a16="http://schemas.microsoft.com/office/drawing/2014/main" id="{63DF1604-DC1D-62A4-4229-F32468113F1D}"/>
+              </a:ext>
+            </a:extLst>
+          </p:cNvPr>
+          <p:cNvSpPr/>
+          <p:nvPr/>
+        </p:nvSpPr>
+        <p:spPr>
+          <a:xfrm>
+            <a:off x="1276352" y="704849"/>
+            <a:ext cx="6732268" cy="6153150"/>
+          </a:xfrm>
+          <a:prstGeom prst="rect">
+            <a:avLst/>
+          </a:prstGeom>
+          <a:noFill/>
+          <a:ln w="28575">
+            <a:noFill/>
+          </a:ln>
+          <a:effectLst/>
+        </p:spPr>
+        <p:style>
+          <a:lnRef idx="1">
+            <a:schemeClr val="accent1"/>
+          </a:lnRef>
+          <a:fillRef idx="3">
+            <a:schemeClr val="accent1"/>
+          </a:fillRef>
+          <a:effectRef idx="2">
+            <a:schemeClr val="accent1"/>
+          </a:effectRef>
+          <a:fontRef idx="minor">
+            <a:schemeClr val="lt1"/>
+          </a:fontRef>
+        </p:style>
+        <p:txBody>
+          <a:bodyPr rtlCol="0" anchor="t"/>
+          <a:lstStyle/>
+          <a:p>
+            <a:endParaRPr sz="1600">
+              <a:solidFill>
+                <a:srgbClr val="000000"/>
+              </a:solidFill>
+              <a:latin typeface="Calibri" panose="020F0502020204030204" pitchFamily="34" charset="0"/>
+              <a:cs typeface="Calibri" panose="020F0502020204030204" pitchFamily="34" charset="0"/>
+            </a:endParaRPr>
+          </a:p>
+        </p:txBody>
+      </p:sp>
+      <p:sp>
+        <p:nvSpPr>
+          <p:cNvPr id="8" name="ELE_VERTICAL_IMAGE_AREA">
+            <a:extLst>
+              <a:ext uri="{FF2B5EF4-FFF2-40B4-BE49-F238E27FC236}">
+                <a16:creationId xmlns:a16="http://schemas.microsoft.com/office/drawing/2014/main" id="{D9A0DF16-14A0-8927-4EC3-E7BD6213414A}"/>
+              </a:ext>
+            </a:extLst>
+          </p:cNvPr>
+          <p:cNvSpPr/>
+          <p:nvPr/>
+        </p:nvSpPr>
+        <p:spPr>
+          <a:xfrm>
+            <a:off x="8008620" y="704849"/>
+            <a:ext cx="4183380" cy="6153150"/>
+          </a:xfrm>
+          <a:prstGeom prst="rect">
+            <a:avLst/>
+          </a:prstGeom>
+          <a:noFill/>
+          <a:ln w="28575">
+            <a:noFill/>
+          </a:ln>
+        </p:spPr>
+        <p:style>
+          <a:lnRef idx="1">
+            <a:schemeClr val="accent1"/>
+          </a:lnRef>
+          <a:fillRef idx="3">
+            <a:schemeClr val="accent1"/>
+          </a:fillRef>
+          <a:effectRef idx="2">
+            <a:schemeClr val="accent1"/>
+          </a:effectRef>
+          <a:fontRef idx="minor">
+            <a:schemeClr val="lt1"/>
+          </a:fontRef>
+        </p:style>
+        <p:txBody>
+          <a:bodyPr rtlCol="0" anchor="ctr"/>
+          <a:lstStyle/>
+          <a:p>
+            <a:pPr algn="ctr"/>
+            <a:endParaRPr sz="1600">
+              <a:solidFill>
+                <a:srgbClr val="000000"/>
+              </a:solidFill>
+              <a:latin typeface="Calibri" panose="020F0502020204030204" pitchFamily="34" charset="0"/>
+              <a:cs typeface="Calibri" panose="020F0502020204030204" pitchFamily="34" charset="0"/>
+            </a:endParaRPr>
           </a:p>
         </p:txBody>
       </p:sp>
@@ -7132,7 +7264,10 @@
           <a:lstStyle/>
           <a:p>
             <a:pPr algn="ctr"/>
-            <a:endParaRPr/>
+            <a:endParaRPr sz="1600">
+              <a:latin typeface="Calibri" panose="020F0502020204030204" pitchFamily="34" charset="0"/>
+              <a:cs typeface="Calibri" panose="020F0502020204030204" pitchFamily="34" charset="0"/>
+            </a:endParaRPr>
           </a:p>
         </p:txBody>
       </p:sp>
@@ -7429,7 +7564,10 @@
           <a:lstStyle/>
           <a:p>
             <a:pPr algn="ctr"/>
-            <a:endParaRPr/>
+            <a:endParaRPr sz="1600">
+              <a:latin typeface="Calibri" panose="020F0502020204030204" pitchFamily="34" charset="0"/>
+              <a:cs typeface="Calibri" panose="020F0502020204030204" pitchFamily="34" charset="0"/>
+            </a:endParaRPr>
           </a:p>
         </p:txBody>
       </p:sp>
@@ -7726,7 +7864,10 @@
           <a:lstStyle/>
           <a:p>
             <a:pPr algn="ctr"/>
-            <a:endParaRPr/>
+            <a:endParaRPr sz="1600">
+              <a:latin typeface="Calibri" panose="020F0502020204030204" pitchFamily="34" charset="0"/>
+              <a:cs typeface="Calibri" panose="020F0502020204030204" pitchFamily="34" charset="0"/>
+            </a:endParaRPr>
           </a:p>
         </p:txBody>
       </p:sp>

</xml_diff>